<commit_message>
lesson 6 lin reg
</commit_message>
<xml_diff>
--- a/lessons/lesson-5/intro-to-regression-analysis.pptx
+++ b/lessons/lesson-5/intro-to-regression-analysis.pptx
@@ -13493,7 +13493,19 @@
                 <a:cs typeface="Georgia"/>
                 <a:sym typeface="Georgia"/>
               </a:rPr>
-              <a:t>Reid Offringa</a:t>
+              <a:t>Reid </a:t>
+            </a:r>
+            <a:r>
+              <a:rPr lang="en-US" sz="2800" b="0" i="1" u="none" strike="noStrike" cap="none" dirty="0" smtClean="0">
+                <a:solidFill>
+                  <a:srgbClr val="E52123"/>
+                </a:solidFill>
+                <a:latin typeface="Georgia"/>
+                <a:ea typeface="Georgia"/>
+                <a:cs typeface="Georgia"/>
+                <a:sym typeface="Georgia"/>
+              </a:rPr>
+              <a:t>Offringa, PhD</a:t>
             </a:r>
             <a:endParaRPr lang="en-US" sz="2800" b="0" i="1" u="none" strike="noStrike" cap="none" dirty="0">
               <a:solidFill>
@@ -13580,7 +13592,7 @@
               <a:buNone/>
             </a:pPr>
             <a:r>
-              <a:rPr lang="en-US" sz="9600" b="1" dirty="0" smtClean="0">
+              <a:rPr lang="en-US" sz="9600" b="1" smtClean="0">
                 <a:solidFill>
                   <a:schemeClr val="lt1"/>
                 </a:solidFill>
@@ -13592,7 +13604,7 @@
               <a:t>REGRESSION </a:t>
             </a:r>
             <a:r>
-              <a:rPr lang="en-US" sz="9600" b="1" dirty="0">
+              <a:rPr lang="en-US" sz="9600" b="1" smtClean="0">
                 <a:solidFill>
                   <a:schemeClr val="lt1"/>
                 </a:solidFill>
@@ -13601,8 +13613,45 @@
                 <a:cs typeface="Arial" charset="0"/>
                 <a:sym typeface="Oswald"/>
               </a:rPr>
-              <a:t>ANALYSIS</a:t>
-            </a:r>
+              <a:t>ANALYSIS: </a:t>
+            </a:r>
+          </a:p>
+          <a:p>
+            <a:pPr lvl="0" rtl="0">
+              <a:lnSpc>
+                <a:spcPct val="75000"/>
+              </a:lnSpc>
+              <a:spcBef>
+                <a:spcPts val="0"/>
+              </a:spcBef>
+              <a:buClr>
+                <a:schemeClr val="dk1"/>
+              </a:buClr>
+              <a:buSzPct val="25000"/>
+              <a:buFont typeface="Arial"/>
+              <a:buNone/>
+            </a:pPr>
+            <a:r>
+              <a:rPr lang="en-US" sz="9600" b="1" smtClean="0">
+                <a:solidFill>
+                  <a:schemeClr val="lt1"/>
+                </a:solidFill>
+                <a:latin typeface="Arial" charset="0"/>
+                <a:ea typeface="Arial" charset="0"/>
+                <a:cs typeface="Arial" charset="0"/>
+                <a:sym typeface="Oswald"/>
+              </a:rPr>
+              <a:t>Deep Dive</a:t>
+            </a:r>
+            <a:endParaRPr lang="en-US" sz="9600" b="1" dirty="0">
+              <a:solidFill>
+                <a:schemeClr val="lt1"/>
+              </a:solidFill>
+              <a:latin typeface="Arial" charset="0"/>
+              <a:ea typeface="Arial" charset="0"/>
+              <a:cs typeface="Arial" charset="0"/>
+              <a:sym typeface="Oswald"/>
+            </a:endParaRPr>
           </a:p>
           <a:p>
             <a:pPr marL="0" marR="0" lvl="0" indent="0" algn="l" rtl="0">
@@ -14337,7 +14386,34 @@
                 <a:cs typeface="Arial" charset="0"/>
                 <a:sym typeface="Georgia"/>
               </a:rPr>
-              <a:t>The data is normally distributed (but doesn’t have to be)</a:t>
+              <a:t>The data </a:t>
+            </a:r>
+            <a:r>
+              <a:rPr lang="en-US" sz="2800" dirty="0" smtClean="0">
+                <a:latin typeface="Arial" charset="0"/>
+                <a:ea typeface="Arial" charset="0"/>
+                <a:cs typeface="Arial" charset="0"/>
+                <a:sym typeface="Georgia"/>
+              </a:rPr>
+              <a:t>are</a:t>
+            </a:r>
+            <a:r>
+              <a:rPr lang="en-US" sz="2800" dirty="0" smtClean="0">
+                <a:latin typeface="Arial" charset="0"/>
+                <a:ea typeface="Arial" charset="0"/>
+                <a:cs typeface="Arial" charset="0"/>
+                <a:sym typeface="Georgia"/>
+              </a:rPr>
+              <a:t> </a:t>
+            </a:r>
+            <a:r>
+              <a:rPr lang="en-US" sz="2800" dirty="0">
+                <a:latin typeface="Arial" charset="0"/>
+                <a:ea typeface="Arial" charset="0"/>
+                <a:cs typeface="Arial" charset="0"/>
+                <a:sym typeface="Georgia"/>
+              </a:rPr>
+              <a:t>normally distributed (but doesn’t have to be)</a:t>
             </a:r>
           </a:p>
           <a:p>
@@ -15411,9 +15487,9 @@
             </a:pPr>
             <a:r>
               <a:rPr lang="en-US" sz="1800">
-                <a:latin typeface="Georgia"/>
-                <a:ea typeface="Georgia"/>
-                <a:cs typeface="Georgia"/>
+                <a:latin typeface="Arial" charset="0"/>
+                <a:ea typeface="Arial" charset="0"/>
+                <a:cs typeface="Arial" charset="0"/>
                 <a:sym typeface="Georgia"/>
               </a:rPr>
               <a:t>Two plots</a:t>
@@ -15458,9 +15534,9 @@
                 <a:solidFill>
                   <a:srgbClr val="000000"/>
                 </a:solidFill>
-                <a:latin typeface="Oswald"/>
-                <a:ea typeface="Oswald"/>
-                <a:cs typeface="Oswald"/>
+                <a:latin typeface="Arial" charset="0"/>
+                <a:ea typeface="Arial" charset="0"/>
+                <a:cs typeface="Arial" charset="0"/>
                 <a:sym typeface="Oswald"/>
               </a:rPr>
               <a:t>DELIVERABLE</a:t>
@@ -15501,10 +15577,10 @@
               <a:buNone/>
             </a:pPr>
             <a:r>
-              <a:rPr lang="en-US" sz="2000" b="1">
-                <a:latin typeface="Oswald"/>
-                <a:ea typeface="Oswald"/>
-                <a:cs typeface="Oswald"/>
+              <a:rPr lang="en-US" sz="2000" b="1" dirty="0">
+                <a:latin typeface="Arial" charset="0"/>
+                <a:ea typeface="Arial" charset="0"/>
+                <a:cs typeface="Arial" charset="0"/>
                 <a:sym typeface="Oswald"/>
               </a:rPr>
               <a:t>DIRECTIONS (15 minutes)</a:t>
@@ -15668,8 +15744,8 @@
         </p:nvSpPr>
         <p:spPr>
           <a:xfrm>
-            <a:off x="635000" y="1473200"/>
-            <a:ext cx="11734800" cy="2806799"/>
+            <a:off x="634999" y="1473200"/>
+            <a:ext cx="12179479" cy="2806799"/>
           </a:xfrm>
           <a:prstGeom prst="rect">
             <a:avLst/>
@@ -15696,7 +15772,7 @@
               <a:buNone/>
             </a:pPr>
             <a:r>
-              <a:rPr lang="en-US" sz="9600" b="1" dirty="0">
+              <a:rPr lang="en-US" sz="9600" b="1" dirty="0" smtClean="0">
                 <a:solidFill>
                   <a:schemeClr val="lt1"/>
                 </a:solidFill>
@@ -15705,8 +15781,17 @@
                 <a:cs typeface="Arial" charset="0"/>
                 <a:sym typeface="Oswald"/>
               </a:rPr>
-              <a:t>SIGNIFICANCE IS KEY</a:t>
-            </a:r>
+              <a:t>Evaluating models</a:t>
+            </a:r>
+            <a:endParaRPr lang="en-US" sz="9600" b="1" dirty="0">
+              <a:solidFill>
+                <a:schemeClr val="lt1"/>
+              </a:solidFill>
+              <a:latin typeface="Arial" charset="0"/>
+              <a:ea typeface="Arial" charset="0"/>
+              <a:cs typeface="Arial" charset="0"/>
+              <a:sym typeface="Oswald"/>
+            </a:endParaRPr>
           </a:p>
           <a:p>
             <a:pPr lvl="0" rtl="0">
@@ -15947,8 +16032,23 @@
                 <a:cs typeface="Arial" charset="0"/>
                 <a:sym typeface="Oswald"/>
               </a:rPr>
-              <a:t>DEMO:  SIGNIFICANCE IS KEY</a:t>
-            </a:r>
+              <a:t>DEMO:  </a:t>
+            </a:r>
+            <a:r>
+              <a:rPr lang="en-US" sz="3200" b="1" dirty="0" smtClean="0">
+                <a:latin typeface="Arial" charset="0"/>
+                <a:ea typeface="Arial" charset="0"/>
+                <a:cs typeface="Arial" charset="0"/>
+                <a:sym typeface="Oswald"/>
+              </a:rPr>
+              <a:t>Evaluating Models</a:t>
+            </a:r>
+            <a:endParaRPr lang="en-US" sz="3200" b="1" dirty="0">
+              <a:latin typeface="Arial" charset="0"/>
+              <a:ea typeface="Arial" charset="0"/>
+              <a:cs typeface="Arial" charset="0"/>
+              <a:sym typeface="Oswald"/>
+            </a:endParaRPr>
           </a:p>
         </p:txBody>
       </p:sp>
@@ -16610,7 +16710,7 @@
               <a:buAutoNum type="arabicPeriod"/>
             </a:pPr>
             <a:r>
-              <a:rPr lang="en-US" sz="1800">
+              <a:rPr lang="en-US" sz="1800" dirty="0">
                 <a:latin typeface="Arial Hebrew" charset="-79"/>
                 <a:ea typeface="Arial Hebrew" charset="-79"/>
                 <a:cs typeface="Arial Hebrew" charset="-79"/>
@@ -16851,7 +16951,7 @@
               <a:buNone/>
             </a:pPr>
             <a:r>
-              <a:rPr lang="en-US" sz="3200" b="1">
+              <a:rPr lang="en-US" sz="3200" b="1" dirty="0">
                 <a:latin typeface="Arial" charset="0"/>
                 <a:ea typeface="Arial" charset="0"/>
                 <a:cs typeface="Arial" charset="0"/>
@@ -17050,7 +17150,7 @@
               </a:spcBef>
               <a:buNone/>
             </a:pPr>
-            <a:endParaRPr sz="2800">
+            <a:endParaRPr sz="2800" dirty="0">
               <a:latin typeface="Arial" charset="0"/>
               <a:ea typeface="Arial" charset="0"/>
               <a:cs typeface="Arial" charset="0"/>
@@ -18156,7 +18256,7 @@
               <a:buNone/>
             </a:pPr>
             <a:r>
-              <a:rPr lang="en-US" sz="1800">
+              <a:rPr lang="en-US" sz="1800" dirty="0">
                 <a:solidFill>
                   <a:srgbClr val="333333"/>
                 </a:solidFill>
@@ -18171,7 +18271,7 @@
               <a:t>lm </a:t>
             </a:r>
             <a:r>
-              <a:rPr lang="en-US" sz="1800">
+              <a:rPr lang="en-US" sz="1800" dirty="0">
                 <a:solidFill>
                   <a:srgbClr val="A71D5D"/>
                 </a:solidFill>
@@ -18186,7 +18286,7 @@
               <a:t>=</a:t>
             </a:r>
             <a:r>
-              <a:rPr lang="en-US" sz="1800">
+              <a:rPr lang="en-US" sz="1800" dirty="0">
                 <a:solidFill>
                   <a:srgbClr val="333333"/>
                 </a:solidFill>
@@ -18198,10 +18298,10 @@
                 <a:cs typeface="Consolas"/>
                 <a:sym typeface="Consolas"/>
               </a:rPr>
-              <a:t> linear_model.LinearRegression()</a:t>
-            </a:r>
-            <a:br>
-              <a:rPr lang="en-US" sz="1800">
+              <a:t> </a:t>
+            </a:r>
+            <a:r>
+              <a:rPr lang="en-US" sz="1800" dirty="0" err="1">
                 <a:solidFill>
                   <a:srgbClr val="333333"/>
                 </a:solidFill>
@@ -18213,9 +18313,10 @@
                 <a:cs typeface="Consolas"/>
                 <a:sym typeface="Consolas"/>
               </a:rPr>
-            </a:br>
-            <a:r>
-              <a:rPr lang="en-US" sz="1800">
+              <a:t>linear_model.LinearRegression</a:t>
+            </a:r>
+            <a:r>
+              <a:rPr lang="en-US" sz="1800" dirty="0">
                 <a:solidFill>
                   <a:srgbClr val="333333"/>
                 </a:solidFill>
@@ -18227,10 +18328,39 @@
                 <a:cs typeface="Consolas"/>
                 <a:sym typeface="Consolas"/>
               </a:rPr>
+              <a:t>()</a:t>
+            </a:r>
+            <a:br>
+              <a:rPr lang="en-US" sz="1800" dirty="0">
+                <a:solidFill>
+                  <a:srgbClr val="333333"/>
+                </a:solidFill>
+                <a:highlight>
+                  <a:srgbClr val="F7F7F7"/>
+                </a:highlight>
+                <a:latin typeface="Consolas"/>
+                <a:ea typeface="Consolas"/>
+                <a:cs typeface="Consolas"/>
+                <a:sym typeface="Consolas"/>
+              </a:rPr>
+            </a:br>
+            <a:r>
+              <a:rPr lang="en-US" sz="1800" dirty="0">
+                <a:solidFill>
+                  <a:srgbClr val="333333"/>
+                </a:solidFill>
+                <a:highlight>
+                  <a:srgbClr val="F7F7F7"/>
+                </a:highlight>
+                <a:latin typeface="Consolas"/>
+                <a:ea typeface="Consolas"/>
+                <a:cs typeface="Consolas"/>
+                <a:sym typeface="Consolas"/>
+              </a:rPr>
               <a:t>weather </a:t>
             </a:r>
             <a:r>
-              <a:rPr lang="en-US" sz="1800">
+              <a:rPr lang="en-US" sz="1800" dirty="0">
                 <a:solidFill>
                   <a:srgbClr val="A71D5D"/>
                 </a:solidFill>
@@ -18245,7 +18375,7 @@
               <a:t>=</a:t>
             </a:r>
             <a:r>
-              <a:rPr lang="en-US" sz="1800">
+              <a:rPr lang="en-US" sz="1800" dirty="0">
                 <a:solidFill>
                   <a:srgbClr val="333333"/>
                 </a:solidFill>
@@ -18257,10 +18387,10 @@
                 <a:cs typeface="Consolas"/>
                 <a:sym typeface="Consolas"/>
               </a:rPr>
-              <a:t> pd.get_dummies(bike_data.weathersit)</a:t>
-            </a:r>
-            <a:br>
-              <a:rPr lang="en-US" sz="1800">
+              <a:t> </a:t>
+            </a:r>
+            <a:r>
+              <a:rPr lang="en-US" sz="1800" dirty="0" err="1">
                 <a:solidFill>
                   <a:srgbClr val="333333"/>
                 </a:solidFill>
@@ -18272,9 +18402,10 @@
                 <a:cs typeface="Consolas"/>
                 <a:sym typeface="Consolas"/>
               </a:rPr>
-            </a:br>
-            <a:r>
-              <a:rPr lang="en-US" sz="1800">
+              <a:t>pd.get_dummies</a:t>
+            </a:r>
+            <a:r>
+              <a:rPr lang="en-US" sz="1800" dirty="0">
                 <a:solidFill>
                   <a:srgbClr val="333333"/>
                 </a:solidFill>
@@ -18286,10 +18417,84 @@
                 <a:cs typeface="Consolas"/>
                 <a:sym typeface="Consolas"/>
               </a:rPr>
-              <a:t>get_linear_model_metrics(weather[[</a:t>
-            </a:r>
-            <a:r>
-              <a:rPr lang="en-US" sz="1800">
+              <a:t>(</a:t>
+            </a:r>
+            <a:r>
+              <a:rPr lang="en-US" sz="1800" dirty="0" err="1">
+                <a:solidFill>
+                  <a:srgbClr val="333333"/>
+                </a:solidFill>
+                <a:highlight>
+                  <a:srgbClr val="F7F7F7"/>
+                </a:highlight>
+                <a:latin typeface="Consolas"/>
+                <a:ea typeface="Consolas"/>
+                <a:cs typeface="Consolas"/>
+                <a:sym typeface="Consolas"/>
+              </a:rPr>
+              <a:t>bike_data.weathersit</a:t>
+            </a:r>
+            <a:r>
+              <a:rPr lang="en-US" sz="1800" dirty="0">
+                <a:solidFill>
+                  <a:srgbClr val="333333"/>
+                </a:solidFill>
+                <a:highlight>
+                  <a:srgbClr val="F7F7F7"/>
+                </a:highlight>
+                <a:latin typeface="Consolas"/>
+                <a:ea typeface="Consolas"/>
+                <a:cs typeface="Consolas"/>
+                <a:sym typeface="Consolas"/>
+              </a:rPr>
+              <a:t>)</a:t>
+            </a:r>
+            <a:br>
+              <a:rPr lang="en-US" sz="1800" dirty="0">
+                <a:solidFill>
+                  <a:srgbClr val="333333"/>
+                </a:solidFill>
+                <a:highlight>
+                  <a:srgbClr val="F7F7F7"/>
+                </a:highlight>
+                <a:latin typeface="Consolas"/>
+                <a:ea typeface="Consolas"/>
+                <a:cs typeface="Consolas"/>
+                <a:sym typeface="Consolas"/>
+              </a:rPr>
+            </a:br>
+            <a:r>
+              <a:rPr lang="en-US" sz="1800" dirty="0" err="1">
+                <a:solidFill>
+                  <a:srgbClr val="333333"/>
+                </a:solidFill>
+                <a:highlight>
+                  <a:srgbClr val="F7F7F7"/>
+                </a:highlight>
+                <a:latin typeface="Consolas"/>
+                <a:ea typeface="Consolas"/>
+                <a:cs typeface="Consolas"/>
+                <a:sym typeface="Consolas"/>
+              </a:rPr>
+              <a:t>get_linear_model_metrics</a:t>
+            </a:r>
+            <a:r>
+              <a:rPr lang="en-US" sz="1800" dirty="0">
+                <a:solidFill>
+                  <a:srgbClr val="333333"/>
+                </a:solidFill>
+                <a:highlight>
+                  <a:srgbClr val="F7F7F7"/>
+                </a:highlight>
+                <a:latin typeface="Consolas"/>
+                <a:ea typeface="Consolas"/>
+                <a:cs typeface="Consolas"/>
+                <a:sym typeface="Consolas"/>
+              </a:rPr>
+              <a:t>(weather[[</a:t>
+            </a:r>
+            <a:r>
+              <a:rPr lang="en-US" sz="1800" dirty="0">
                 <a:solidFill>
                   <a:srgbClr val="0086B3"/>
                 </a:solidFill>
@@ -18304,7 +18509,7 @@
               <a:t>1</a:t>
             </a:r>
             <a:r>
-              <a:rPr lang="en-US" sz="1800">
+              <a:rPr lang="en-US" sz="1800" dirty="0">
                 <a:solidFill>
                   <a:srgbClr val="333333"/>
                 </a:solidFill>
@@ -18319,7 +18524,7 @@
               <a:t>, </a:t>
             </a:r>
             <a:r>
-              <a:rPr lang="en-US" sz="1800">
+              <a:rPr lang="en-US" sz="1800" dirty="0">
                 <a:solidFill>
                   <a:srgbClr val="0086B3"/>
                 </a:solidFill>
@@ -18334,7 +18539,7 @@
               <a:t>2</a:t>
             </a:r>
             <a:r>
-              <a:rPr lang="en-US" sz="1800">
+              <a:rPr lang="en-US" sz="1800" dirty="0">
                 <a:solidFill>
                   <a:srgbClr val="333333"/>
                 </a:solidFill>
@@ -18349,7 +18554,7 @@
               <a:t>, </a:t>
             </a:r>
             <a:r>
-              <a:rPr lang="en-US" sz="1800">
+              <a:rPr lang="en-US" sz="1800" dirty="0">
                 <a:solidFill>
                   <a:srgbClr val="0086B3"/>
                 </a:solidFill>
@@ -18364,7 +18569,7 @@
               <a:t>3</a:t>
             </a:r>
             <a:r>
-              <a:rPr lang="en-US" sz="1800">
+              <a:rPr lang="en-US" sz="1800" dirty="0">
                 <a:solidFill>
                   <a:srgbClr val="333333"/>
                 </a:solidFill>
@@ -18379,7 +18584,7 @@
               <a:t>, </a:t>
             </a:r>
             <a:r>
-              <a:rPr lang="en-US" sz="1800">
+              <a:rPr lang="en-US" sz="1800" dirty="0">
                 <a:solidFill>
                   <a:srgbClr val="0086B3"/>
                 </a:solidFill>
@@ -18394,7 +18599,7 @@
               <a:t>4</a:t>
             </a:r>
             <a:r>
-              <a:rPr lang="en-US" sz="1800">
+              <a:rPr lang="en-US" sz="1800" dirty="0">
                 <a:solidFill>
                   <a:srgbClr val="333333"/>
                 </a:solidFill>
@@ -18409,7 +18614,7 @@
               <a:t>]], y, lm)</a:t>
             </a:r>
             <a:br>
-              <a:rPr lang="en-US" sz="1800">
+              <a:rPr lang="en-US" sz="1800" dirty="0">
                 <a:solidFill>
                   <a:srgbClr val="333333"/>
                 </a:solidFill>
@@ -18423,7 +18628,7 @@
               </a:rPr>
             </a:br>
             <a:r>
-              <a:rPr lang="en-US" sz="1800">
+              <a:rPr lang="en-US" sz="1800" dirty="0">
                 <a:solidFill>
                   <a:srgbClr val="A71D5D"/>
                 </a:solidFill>
@@ -18438,7 +18643,7 @@
               <a:t>print</a:t>
             </a:r>
             <a:r>
-              <a:rPr lang="en-US" sz="1800">
+              <a:rPr lang="en-US" sz="1800" dirty="0">
                 <a:solidFill>
                   <a:srgbClr val="333333"/>
                 </a:solidFill>
@@ -18453,7 +18658,7 @@
               <a:t/>
             </a:r>
             <a:br>
-              <a:rPr lang="en-US" sz="1800">
+              <a:rPr lang="en-US" sz="1800" dirty="0">
                 <a:solidFill>
                   <a:srgbClr val="333333"/>
                 </a:solidFill>
@@ -18467,7 +18672,7 @@
               </a:rPr>
             </a:br>
             <a:r>
-              <a:rPr lang="en-US" sz="1800">
+              <a:rPr lang="en-US" sz="1800" dirty="0">
                 <a:solidFill>
                   <a:srgbClr val="969896"/>
                 </a:solidFill>
@@ -18482,7 +18687,7 @@
               <a:t># drop the least significant, weather situation  = 4</a:t>
             </a:r>
             <a:r>
-              <a:rPr lang="en-US" sz="1800">
+              <a:rPr lang="en-US" sz="1800" dirty="0">
                 <a:solidFill>
                   <a:srgbClr val="333333"/>
                 </a:solidFill>
@@ -18497,7 +18702,7 @@
               <a:t/>
             </a:r>
             <a:br>
-              <a:rPr lang="en-US" sz="1800">
+              <a:rPr lang="en-US" sz="1800" dirty="0">
                 <a:solidFill>
                   <a:srgbClr val="333333"/>
                 </a:solidFill>
@@ -18511,7 +18716,7 @@
               </a:rPr>
             </a:br>
             <a:r>
-              <a:rPr lang="en-US" sz="1800">
+              <a:rPr lang="en-US" sz="1800" dirty="0" err="1">
                 <a:solidFill>
                   <a:srgbClr val="333333"/>
                 </a:solidFill>
@@ -18523,10 +18728,25 @@
                 <a:cs typeface="Consolas"/>
                 <a:sym typeface="Consolas"/>
               </a:rPr>
-              <a:t>get_linear_model_metrics(weather[[</a:t>
-            </a:r>
-            <a:r>
-              <a:rPr lang="en-US" sz="1800">
+              <a:t>get_linear_model_metrics</a:t>
+            </a:r>
+            <a:r>
+              <a:rPr lang="en-US" sz="1800" dirty="0">
+                <a:solidFill>
+                  <a:srgbClr val="333333"/>
+                </a:solidFill>
+                <a:highlight>
+                  <a:srgbClr val="F7F7F7"/>
+                </a:highlight>
+                <a:latin typeface="Consolas"/>
+                <a:ea typeface="Consolas"/>
+                <a:cs typeface="Consolas"/>
+                <a:sym typeface="Consolas"/>
+              </a:rPr>
+              <a:t>(weather[[</a:t>
+            </a:r>
+            <a:r>
+              <a:rPr lang="en-US" sz="1800" dirty="0">
                 <a:solidFill>
                   <a:srgbClr val="0086B3"/>
                 </a:solidFill>
@@ -18541,7 +18761,7 @@
               <a:t>1</a:t>
             </a:r>
             <a:r>
-              <a:rPr lang="en-US" sz="1800">
+              <a:rPr lang="en-US" sz="1800" dirty="0">
                 <a:solidFill>
                   <a:srgbClr val="333333"/>
                 </a:solidFill>
@@ -18556,7 +18776,7 @@
               <a:t>, </a:t>
             </a:r>
             <a:r>
-              <a:rPr lang="en-US" sz="1800">
+              <a:rPr lang="en-US" sz="1800" dirty="0">
                 <a:solidFill>
                   <a:srgbClr val="0086B3"/>
                 </a:solidFill>
@@ -18571,7 +18791,7 @@
               <a:t>2</a:t>
             </a:r>
             <a:r>
-              <a:rPr lang="en-US" sz="1800">
+              <a:rPr lang="en-US" sz="1800" dirty="0">
                 <a:solidFill>
                   <a:srgbClr val="333333"/>
                 </a:solidFill>
@@ -18586,7 +18806,7 @@
               <a:t>, </a:t>
             </a:r>
             <a:r>
-              <a:rPr lang="en-US" sz="1800">
+              <a:rPr lang="en-US" sz="1800" dirty="0">
                 <a:solidFill>
                   <a:srgbClr val="0086B3"/>
                 </a:solidFill>
@@ -18601,7 +18821,7 @@
               <a:t>3</a:t>
             </a:r>
             <a:r>
-              <a:rPr lang="en-US" sz="1800">
+              <a:rPr lang="en-US" sz="1800" dirty="0">
                 <a:solidFill>
                   <a:srgbClr val="333333"/>
                 </a:solidFill>
@@ -24113,17 +24333,21 @@
                 <a:cs typeface="Arial" charset="0"/>
                 <a:sym typeface="Georgia"/>
               </a:rPr>
-              <a:t>How do you dummy a category variable?</a:t>
-            </a:r>
-          </a:p>
-          <a:p>
-            <a:pPr lvl="0" rtl="0">
-              <a:spcBef>
-                <a:spcPts val="0"/>
-              </a:spcBef>
-              <a:buNone/>
-            </a:pPr>
-            <a:endParaRPr sz="2800" dirty="0">
+              <a:t>How do you dummy a category variable</a:t>
+            </a:r>
+            <a:r>
+              <a:rPr lang="en-US" sz="2800" dirty="0" smtClean="0">
+                <a:solidFill>
+                  <a:schemeClr val="dk1"/>
+                </a:solidFill>
+                <a:latin typeface="Arial" charset="0"/>
+                <a:ea typeface="Arial" charset="0"/>
+                <a:cs typeface="Arial" charset="0"/>
+                <a:sym typeface="Georgia"/>
+              </a:rPr>
+              <a:t>?</a:t>
+            </a:r>
+            <a:endParaRPr lang="en-US" sz="2800" dirty="0">
               <a:solidFill>
                 <a:schemeClr val="dk1"/>
               </a:solidFill>
@@ -24132,30 +24356,6 @@
               <a:cs typeface="Arial" charset="0"/>
               <a:sym typeface="Georgia"/>
             </a:endParaRPr>
-          </a:p>
-          <a:p>
-            <a:pPr lvl="1" rtl="0">
-              <a:spcBef>
-                <a:spcPts val="0"/>
-              </a:spcBef>
-              <a:buClr>
-                <a:schemeClr val="dk1"/>
-              </a:buClr>
-              <a:buSzPct val="100000"/>
-              <a:buFont typeface="Georgia"/>
-            </a:pPr>
-            <a:r>
-              <a:rPr lang="en-US" sz="2800" dirty="0">
-                <a:solidFill>
-                  <a:schemeClr val="dk1"/>
-                </a:solidFill>
-                <a:latin typeface="Arial" charset="0"/>
-                <a:ea typeface="Arial" charset="0"/>
-                <a:cs typeface="Arial" charset="0"/>
-                <a:sym typeface="Georgia"/>
-              </a:rPr>
-              <a:t>How do you avoid a singular matrix?</a:t>
-            </a:r>
           </a:p>
         </p:txBody>
       </p:sp>
@@ -26104,14 +26304,100 @@
               <a:t>m</a:t>
             </a:r>
             <a:r>
+              <a:rPr lang="en-US" sz="2800" dirty="0" smtClean="0">
+                <a:latin typeface="Arial" charset="0"/>
+                <a:ea typeface="Arial" charset="0"/>
+                <a:cs typeface="Arial" charset="0"/>
+                <a:sym typeface="Georgia"/>
+              </a:rPr>
+              <a:t>.</a:t>
+            </a:r>
+          </a:p>
+          <a:p>
+            <a:pPr marL="203200" marR="0" lvl="0" indent="-256540" algn="l" rtl="0">
+              <a:spcBef>
+                <a:spcPts val="0"/>
+              </a:spcBef>
+              <a:buSzPct val="100000"/>
+              <a:buFont typeface="Georgia"/>
+              <a:buChar char="‣"/>
+            </a:pPr>
+            <a:endParaRPr lang="en-US" sz="2800" dirty="0">
+              <a:latin typeface="Arial" charset="0"/>
+              <a:ea typeface="Arial" charset="0"/>
+              <a:cs typeface="Arial" charset="0"/>
+              <a:sym typeface="Georgia"/>
+            </a:endParaRPr>
+          </a:p>
+          <a:p>
+            <a:pPr marL="203200" marR="0" lvl="0" indent="-256540" algn="l" rtl="0">
+              <a:spcBef>
+                <a:spcPts val="0"/>
+              </a:spcBef>
+              <a:buSzPct val="100000"/>
+              <a:buFont typeface="Georgia"/>
+              <a:buChar char="‣"/>
+            </a:pPr>
+            <a:r>
               <a:rPr lang="en-US" sz="2800" dirty="0">
                 <a:latin typeface="Arial" charset="0"/>
                 <a:ea typeface="Arial" charset="0"/>
                 <a:cs typeface="Arial" charset="0"/>
                 <a:sym typeface="Georgia"/>
               </a:rPr>
-              <a:t>.</a:t>
-            </a:r>
+              <a:t>y</a:t>
+            </a:r>
+            <a:r>
+              <a:rPr lang="en-US" sz="2800" dirty="0" smtClean="0">
+                <a:latin typeface="Arial" charset="0"/>
+                <a:ea typeface="Arial" charset="0"/>
+                <a:cs typeface="Arial" charset="0"/>
+                <a:sym typeface="Georgia"/>
+              </a:rPr>
+              <a:t> = </a:t>
+            </a:r>
+            <a:r>
+              <a:rPr lang="en-US" sz="2800" i="1" dirty="0" err="1" smtClean="0">
+                <a:latin typeface="Arial" charset="0"/>
+                <a:ea typeface="Arial" charset="0"/>
+                <a:cs typeface="Arial" charset="0"/>
+                <a:sym typeface="Georgia"/>
+              </a:rPr>
+              <a:t>b</a:t>
+            </a:r>
+            <a:r>
+              <a:rPr lang="en-US" sz="2800" dirty="0" err="1" smtClean="0">
+                <a:latin typeface="Arial" charset="0"/>
+                <a:ea typeface="Arial" charset="0"/>
+                <a:cs typeface="Arial" charset="0"/>
+                <a:sym typeface="Georgia"/>
+              </a:rPr>
+              <a:t>x</a:t>
+            </a:r>
+            <a:r>
+              <a:rPr lang="en-US" sz="2800" dirty="0" smtClean="0">
+                <a:latin typeface="Arial" charset="0"/>
+                <a:ea typeface="Arial" charset="0"/>
+                <a:cs typeface="Arial" charset="0"/>
+                <a:sym typeface="Georgia"/>
+              </a:rPr>
+              <a:t>+ </a:t>
+            </a:r>
+            <a:r>
+              <a:rPr lang="en-US" sz="2800" i="1" dirty="0" smtClean="0">
+                <a:latin typeface="Arial" charset="0"/>
+                <a:ea typeface="Arial" charset="0"/>
+                <a:cs typeface="Arial" charset="0"/>
+                <a:sym typeface="Georgia"/>
+              </a:rPr>
+              <a:t>e</a:t>
+            </a:r>
+            <a:endParaRPr lang="en-US" sz="2800" i="1" dirty="0">
+              <a:latin typeface="Arial" charset="0"/>
+              <a:ea typeface="Arial" charset="0"/>
+              <a:cs typeface="Arial" charset="0"/>
+              <a:sym typeface="Georgia"/>
+            </a:endParaRPr>
           </a:p>
           <a:p>
             <a:pPr marR="0" lvl="0" algn="l" rtl="0">

</xml_diff>